<commit_message>
forgot to save some
</commit_message>
<xml_diff>
--- a/day-1/route53.pptx
+++ b/day-1/route53.pptx
@@ -5,7 +5,7 @@
     <p:sldMasterId id="2147483648" r:id="rId1"/>
   </p:sldMasterIdLst>
   <p:notesMasterIdLst>
-    <p:notesMasterId r:id="rId10"/>
+    <p:notesMasterId r:id="rId12"/>
   </p:notesMasterIdLst>
   <p:sldIdLst>
     <p:sldId id="256" r:id="rId2"/>
@@ -14,8 +14,10 @@
     <p:sldId id="264" r:id="rId5"/>
     <p:sldId id="259" r:id="rId6"/>
     <p:sldId id="261" r:id="rId7"/>
-    <p:sldId id="265" r:id="rId8"/>
-    <p:sldId id="260" r:id="rId9"/>
+    <p:sldId id="260" r:id="rId8"/>
+    <p:sldId id="265" r:id="rId9"/>
+    <p:sldId id="267" r:id="rId10"/>
+    <p:sldId id="266" r:id="rId11"/>
   </p:sldIdLst>
   <p:sldSz cx="12192000" cy="6858000"/>
   <p:notesSz cx="6858000" cy="9144000"/>
@@ -956,6 +958,17 @@
               <a:cs typeface="+mn-cs"/>
             </a:endParaRPr>
           </a:p>
+          <a:p>
+            <a:endParaRPr lang="en-AU" sz="1200" b="0" i="0" kern="1200" dirty="0">
+              <a:solidFill>
+                <a:schemeClr val="tx1"/>
+              </a:solidFill>
+              <a:effectLst/>
+              <a:latin typeface="+mn-lt"/>
+              <a:ea typeface="+mn-ea"/>
+              <a:cs typeface="+mn-cs"/>
+            </a:endParaRPr>
+          </a:p>
         </p:txBody>
       </p:sp>
       <p:sp>
@@ -1389,71 +1402,11 @@
           <a:lstStyle/>
           <a:p>
             <a:r>
-              <a:rPr lang="en-AU" sz="1200" b="0" i="0" kern="1200" dirty="0">
-                <a:solidFill>
-                  <a:schemeClr val="tx1"/>
-                </a:solidFill>
-                <a:effectLst/>
-                <a:latin typeface="+mn-lt"/>
-                <a:ea typeface="+mn-ea"/>
-                <a:cs typeface="+mn-cs"/>
+              <a:rPr lang="en-AU" dirty="0">
+                <a:hlinkClick r:id="rId3"/>
               </a:rPr>
-              <a:t>Enabling Transfer Lock on your AWS Route 53 registered domains to prevent unauthorized transfers to other domain name registrars. With the Transfer Lock feature enabled on registered AWS Route 53 domain names </a:t>
-            </a:r>
-            <a:r>
-              <a:rPr lang="en-AU" sz="1200" b="0" i="1" kern="1200" dirty="0">
-                <a:solidFill>
-                  <a:schemeClr val="tx1"/>
-                </a:solidFill>
-                <a:effectLst/>
-                <a:latin typeface="+mn-lt"/>
-                <a:ea typeface="+mn-ea"/>
-                <a:cs typeface="+mn-cs"/>
-              </a:rPr>
-              <a:t>(or domain names transferred to Route 53)</a:t>
-            </a:r>
-            <a:r>
-              <a:rPr lang="en-AU" sz="1200" b="0" i="0" kern="1200" dirty="0">
-                <a:solidFill>
-                  <a:schemeClr val="tx1"/>
-                </a:solidFill>
-                <a:effectLst/>
-                <a:latin typeface="+mn-lt"/>
-                <a:ea typeface="+mn-ea"/>
-                <a:cs typeface="+mn-cs"/>
-              </a:rPr>
-              <a:t>, you ensure that all transfer requests are rejected automatically, thus providing you with extra protection against domain hijacking.</a:t>
-            </a:r>
-          </a:p>
-          <a:p>
-            <a:r>
-              <a:rPr lang="en-AU" sz="1200" b="0" i="0" kern="1200" dirty="0">
-                <a:solidFill>
-                  <a:schemeClr val="tx1"/>
-                </a:solidFill>
-                <a:effectLst/>
-                <a:latin typeface="+mn-lt"/>
-                <a:ea typeface="+mn-ea"/>
-                <a:cs typeface="+mn-cs"/>
-              </a:rPr>
-              <a:t>Ensuring you do not define private DNS records within your AWS Route 53 public hosted zone prevents exposing your internal (private) network and the resources hosted on it. It also helps to optimize Route 53 service costs. In cases where a split-view DNS method is necessary, we recommend that you define your private DNS records in a Route 53 private hosted zone, which you can then use with a public hosted zone to implement the split-view DNS for your applications.</a:t>
-            </a:r>
-          </a:p>
-          <a:p>
-            <a:r>
-              <a:rPr lang="en-AU" sz="1200" b="0" i="0" kern="1200" dirty="0">
-                <a:solidFill>
-                  <a:schemeClr val="tx1"/>
-                </a:solidFill>
-                <a:effectLst/>
-                <a:latin typeface="+mn-lt"/>
-                <a:ea typeface="+mn-ea"/>
-                <a:cs typeface="+mn-cs"/>
-              </a:rPr>
-              <a:t>Identifying and removing dangling DNS records from your AWS Route 53 public-hosted zones to protect against malicious activity and ensure the integrity of your domains/subdomains.</a:t>
-            </a:r>
-          </a:p>
-          <a:p>
+              <a:t>https://docs.aws.amazon.com/Route53/latest/DeveloperGuide/domain-lock.html</a:t>
+            </a:r>
             <a:endParaRPr lang="en-US" dirty="0"/>
           </a:p>
         </p:txBody>
@@ -1475,7 +1428,7 @@
           <a:p>
             <a:fld id="{2B40201D-7602-074C-A878-E3718E537E14}" type="slidenum">
               <a:rPr lang="en-US" smtClean="0"/>
-              <a:t>8</a:t>
+              <a:t>7</a:t>
             </a:fld>
             <a:endParaRPr lang="en-US"/>
           </a:p>
@@ -1485,6 +1438,183 @@
     <p:extLst>
       <p:ext uri="{BB962C8B-B14F-4D97-AF65-F5344CB8AC3E}">
         <p14:creationId xmlns:p14="http://schemas.microsoft.com/office/powerpoint/2010/main" val="3038268280"/>
+      </p:ext>
+    </p:extLst>
+  </p:cSld>
+  <p:clrMapOvr>
+    <a:masterClrMapping/>
+  </p:clrMapOvr>
+</p:notes>
+</file>
+
+<file path=ppt/notesSlides/notesSlide6.xml><?xml version="1.0" encoding="utf-8"?>
+<p:notes xmlns:a="http://schemas.openxmlformats.org/drawingml/2006/main" xmlns:r="http://schemas.openxmlformats.org/officeDocument/2006/relationships" xmlns:p="http://schemas.openxmlformats.org/presentationml/2006/main">
+  <p:cSld>
+    <p:spTree>
+      <p:nvGrpSpPr>
+        <p:cNvPr id="1" name=""/>
+        <p:cNvGrpSpPr/>
+        <p:nvPr/>
+      </p:nvGrpSpPr>
+      <p:grpSpPr>
+        <a:xfrm>
+          <a:off x="0" y="0"/>
+          <a:ext cx="0" cy="0"/>
+          <a:chOff x="0" y="0"/>
+          <a:chExt cx="0" cy="0"/>
+        </a:xfrm>
+      </p:grpSpPr>
+      <p:sp>
+        <p:nvSpPr>
+          <p:cNvPr id="2" name="Slide Image Placeholder 1"/>
+          <p:cNvSpPr>
+            <a:spLocks noGrp="1" noRot="1" noChangeAspect="1"/>
+          </p:cNvSpPr>
+          <p:nvPr>
+            <p:ph type="sldImg"/>
+          </p:nvPr>
+        </p:nvSpPr>
+        <p:spPr/>
+      </p:sp>
+      <p:sp>
+        <p:nvSpPr>
+          <p:cNvPr id="3" name="Notes Placeholder 2"/>
+          <p:cNvSpPr>
+            <a:spLocks noGrp="1"/>
+          </p:cNvSpPr>
+          <p:nvPr>
+            <p:ph type="body" idx="1"/>
+          </p:nvPr>
+        </p:nvSpPr>
+        <p:spPr/>
+        <p:txBody>
+          <a:bodyPr/>
+          <a:lstStyle/>
+          <a:p>
+            <a:endParaRPr lang="en-US" dirty="0"/>
+          </a:p>
+        </p:txBody>
+      </p:sp>
+      <p:sp>
+        <p:nvSpPr>
+          <p:cNvPr id="4" name="Slide Number Placeholder 3"/>
+          <p:cNvSpPr>
+            <a:spLocks noGrp="1"/>
+          </p:cNvSpPr>
+          <p:nvPr>
+            <p:ph type="sldNum" sz="quarter" idx="5"/>
+          </p:nvPr>
+        </p:nvSpPr>
+        <p:spPr/>
+        <p:txBody>
+          <a:bodyPr/>
+          <a:lstStyle/>
+          <a:p>
+            <a:fld id="{2B40201D-7602-074C-A878-E3718E537E14}" type="slidenum">
+              <a:rPr lang="en-US" smtClean="0"/>
+              <a:t>9</a:t>
+            </a:fld>
+            <a:endParaRPr lang="en-US"/>
+          </a:p>
+        </p:txBody>
+      </p:sp>
+    </p:spTree>
+    <p:extLst>
+      <p:ext uri="{BB962C8B-B14F-4D97-AF65-F5344CB8AC3E}">
+        <p14:creationId xmlns:p14="http://schemas.microsoft.com/office/powerpoint/2010/main" val="3536752627"/>
+      </p:ext>
+    </p:extLst>
+  </p:cSld>
+  <p:clrMapOvr>
+    <a:masterClrMapping/>
+  </p:clrMapOvr>
+</p:notes>
+</file>
+
+<file path=ppt/notesSlides/notesSlide7.xml><?xml version="1.0" encoding="utf-8"?>
+<p:notes xmlns:a="http://schemas.openxmlformats.org/drawingml/2006/main" xmlns:r="http://schemas.openxmlformats.org/officeDocument/2006/relationships" xmlns:p="http://schemas.openxmlformats.org/presentationml/2006/main">
+  <p:cSld>
+    <p:spTree>
+      <p:nvGrpSpPr>
+        <p:cNvPr id="1" name=""/>
+        <p:cNvGrpSpPr/>
+        <p:nvPr/>
+      </p:nvGrpSpPr>
+      <p:grpSpPr>
+        <a:xfrm>
+          <a:off x="0" y="0"/>
+          <a:ext cx="0" cy="0"/>
+          <a:chOff x="0" y="0"/>
+          <a:chExt cx="0" cy="0"/>
+        </a:xfrm>
+      </p:grpSpPr>
+      <p:sp>
+        <p:nvSpPr>
+          <p:cNvPr id="2" name="Slide Image Placeholder 1"/>
+          <p:cNvSpPr>
+            <a:spLocks noGrp="1" noRot="1" noChangeAspect="1"/>
+          </p:cNvSpPr>
+          <p:nvPr>
+            <p:ph type="sldImg"/>
+          </p:nvPr>
+        </p:nvSpPr>
+        <p:spPr/>
+      </p:sp>
+      <p:sp>
+        <p:nvSpPr>
+          <p:cNvPr id="3" name="Notes Placeholder 2"/>
+          <p:cNvSpPr>
+            <a:spLocks noGrp="1"/>
+          </p:cNvSpPr>
+          <p:nvPr>
+            <p:ph type="body" idx="1"/>
+          </p:nvPr>
+        </p:nvSpPr>
+        <p:spPr/>
+        <p:txBody>
+          <a:bodyPr/>
+          <a:lstStyle/>
+          <a:p>
+            <a:r>
+              <a:rPr lang="en-US" dirty="0"/>
+              <a:t>Infra as code that couples the deletion of EIPs/s3 buckets with hosted zone records?</a:t>
+            </a:r>
+          </a:p>
+          <a:p>
+            <a:r>
+              <a:rPr lang="en-US" dirty="0"/>
+              <a:t>Script the checks for misconfigurations</a:t>
+            </a:r>
+          </a:p>
+        </p:txBody>
+      </p:sp>
+      <p:sp>
+        <p:nvSpPr>
+          <p:cNvPr id="4" name="Slide Number Placeholder 3"/>
+          <p:cNvSpPr>
+            <a:spLocks noGrp="1"/>
+          </p:cNvSpPr>
+          <p:nvPr>
+            <p:ph type="sldNum" sz="quarter" idx="5"/>
+          </p:nvPr>
+        </p:nvSpPr>
+        <p:spPr/>
+        <p:txBody>
+          <a:bodyPr/>
+          <a:lstStyle/>
+          <a:p>
+            <a:fld id="{2B40201D-7602-074C-A878-E3718E537E14}" type="slidenum">
+              <a:rPr lang="en-US" smtClean="0"/>
+              <a:t>10</a:t>
+            </a:fld>
+            <a:endParaRPr lang="en-US"/>
+          </a:p>
+        </p:txBody>
+      </p:sp>
+    </p:spTree>
+    <p:extLst>
+      <p:ext uri="{BB962C8B-B14F-4D97-AF65-F5344CB8AC3E}">
+        <p14:creationId xmlns:p14="http://schemas.microsoft.com/office/powerpoint/2010/main" val="2549186263"/>
       </p:ext>
     </p:extLst>
   </p:cSld>
@@ -6795,6 +6925,98 @@
     <p:extLst>
       <p:ext uri="{BB962C8B-B14F-4D97-AF65-F5344CB8AC3E}">
         <p14:creationId xmlns:p14="http://schemas.microsoft.com/office/powerpoint/2010/main" val="3174072207"/>
+      </p:ext>
+    </p:extLst>
+  </p:cSld>
+  <p:clrMapOvr>
+    <a:masterClrMapping/>
+  </p:clrMapOvr>
+</p:sld>
+</file>
+
+<file path=ppt/slides/slide10.xml><?xml version="1.0" encoding="utf-8"?>
+<p:sld xmlns:a="http://schemas.openxmlformats.org/drawingml/2006/main" xmlns:r="http://schemas.openxmlformats.org/officeDocument/2006/relationships" xmlns:p="http://schemas.openxmlformats.org/presentationml/2006/main">
+  <p:cSld>
+    <p:spTree>
+      <p:nvGrpSpPr>
+        <p:cNvPr id="1" name=""/>
+        <p:cNvGrpSpPr/>
+        <p:nvPr/>
+      </p:nvGrpSpPr>
+      <p:grpSpPr>
+        <a:xfrm>
+          <a:off x="0" y="0"/>
+          <a:ext cx="0" cy="0"/>
+          <a:chOff x="0" y="0"/>
+          <a:chExt cx="0" cy="0"/>
+        </a:xfrm>
+      </p:grpSpPr>
+      <p:sp>
+        <p:nvSpPr>
+          <p:cNvPr id="2" name="Title 1">
+            <a:extLst>
+              <a:ext uri="{FF2B5EF4-FFF2-40B4-BE49-F238E27FC236}">
+                <a16:creationId xmlns:a16="http://schemas.microsoft.com/office/drawing/2014/main" id="{30DABD7D-833B-6148-8871-58C210D0EF27}"/>
+              </a:ext>
+            </a:extLst>
+          </p:cNvPr>
+          <p:cNvSpPr>
+            <a:spLocks noGrp="1"/>
+          </p:cNvSpPr>
+          <p:nvPr>
+            <p:ph type="title"/>
+          </p:nvPr>
+        </p:nvSpPr>
+        <p:spPr/>
+        <p:txBody>
+          <a:bodyPr/>
+          <a:lstStyle/>
+          <a:p>
+            <a:r>
+              <a:rPr lang="en-US" dirty="0"/>
+              <a:t>So, how do I prevent this?</a:t>
+            </a:r>
+          </a:p>
+        </p:txBody>
+      </p:sp>
+      <p:sp>
+        <p:nvSpPr>
+          <p:cNvPr id="3" name="Content Placeholder 2">
+            <a:extLst>
+              <a:ext uri="{FF2B5EF4-FFF2-40B4-BE49-F238E27FC236}">
+                <a16:creationId xmlns:a16="http://schemas.microsoft.com/office/drawing/2014/main" id="{60E6392A-2923-0949-A8C2-08DB4403573E}"/>
+              </a:ext>
+            </a:extLst>
+          </p:cNvPr>
+          <p:cNvSpPr>
+            <a:spLocks noGrp="1"/>
+          </p:cNvSpPr>
+          <p:nvPr>
+            <p:ph idx="1"/>
+          </p:nvPr>
+        </p:nvSpPr>
+        <p:spPr/>
+        <p:txBody>
+          <a:bodyPr/>
+          <a:lstStyle/>
+          <a:p>
+            <a:r>
+              <a:rPr lang="en-US" dirty="0"/>
+              <a:t>Be aware of what you’re deleting!</a:t>
+            </a:r>
+          </a:p>
+          <a:p>
+            <a:r>
+              <a:rPr lang="en-US" dirty="0"/>
+              <a:t>SecOps the crap out of it!</a:t>
+            </a:r>
+          </a:p>
+        </p:txBody>
+      </p:sp>
+    </p:spTree>
+    <p:extLst>
+      <p:ext uri="{BB962C8B-B14F-4D97-AF65-F5344CB8AC3E}">
+        <p14:creationId xmlns:p14="http://schemas.microsoft.com/office/powerpoint/2010/main" val="3933106645"/>
       </p:ext>
     </p:extLst>
   </p:cSld>
@@ -8249,6 +8471,85 @@
           </a:p>
         </p:txBody>
       </p:sp>
+      <p:sp>
+        <p:nvSpPr>
+          <p:cNvPr id="4" name="Rectangle 3">
+            <a:extLst>
+              <a:ext uri="{FF2B5EF4-FFF2-40B4-BE49-F238E27FC236}">
+                <a16:creationId xmlns:a16="http://schemas.microsoft.com/office/drawing/2014/main" id="{5AF1ED99-56DA-9440-936D-D96665B0741F}"/>
+              </a:ext>
+            </a:extLst>
+          </p:cNvPr>
+          <p:cNvSpPr/>
+          <p:nvPr/>
+        </p:nvSpPr>
+        <p:spPr>
+          <a:xfrm>
+            <a:off x="3428034" y="4908535"/>
+            <a:ext cx="5335929" cy="970451"/>
+          </a:xfrm>
+          <a:prstGeom prst="rect">
+            <a:avLst/>
+          </a:prstGeom>
+        </p:spPr>
+        <p:style>
+          <a:lnRef idx="2">
+            <a:schemeClr val="accent1">
+              <a:shade val="50000"/>
+            </a:schemeClr>
+          </a:lnRef>
+          <a:fillRef idx="1">
+            <a:schemeClr val="accent1"/>
+          </a:fillRef>
+          <a:effectRef idx="0">
+            <a:schemeClr val="accent1"/>
+          </a:effectRef>
+          <a:fontRef idx="minor">
+            <a:schemeClr val="lt1"/>
+          </a:fontRef>
+        </p:style>
+        <p:txBody>
+          <a:bodyPr rtlCol="0" anchor="ctr"/>
+          <a:lstStyle/>
+          <a:p>
+            <a:pPr algn="ctr"/>
+            <a:r>
+              <a:rPr lang="en-US" dirty="0"/>
+              <a:t>How can this be harmful?</a:t>
+            </a:r>
+          </a:p>
+        </p:txBody>
+      </p:sp>
+      <p:pic>
+        <p:nvPicPr>
+          <p:cNvPr id="5" name="Picture 4">
+            <a:extLst>
+              <a:ext uri="{FF2B5EF4-FFF2-40B4-BE49-F238E27FC236}">
+                <a16:creationId xmlns:a16="http://schemas.microsoft.com/office/drawing/2014/main" id="{78D11A2B-AA43-3941-AA1A-24CD8DD286E0}"/>
+              </a:ext>
+            </a:extLst>
+          </p:cNvPr>
+          <p:cNvPicPr>
+            <a:picLocks noChangeAspect="1"/>
+          </p:cNvPicPr>
+          <p:nvPr/>
+        </p:nvPicPr>
+        <p:blipFill>
+          <a:blip r:embed="rId3"/>
+          <a:stretch>
+            <a:fillRect/>
+          </a:stretch>
+        </p:blipFill>
+        <p:spPr>
+          <a:xfrm>
+            <a:off x="8251062" y="2476982"/>
+            <a:ext cx="2573628" cy="2916778"/>
+          </a:xfrm>
+          <a:prstGeom prst="rect">
+            <a:avLst/>
+          </a:prstGeom>
+        </p:spPr>
+      </p:pic>
     </p:spTree>
     <p:extLst>
       <p:ext uri="{BB962C8B-B14F-4D97-AF65-F5344CB8AC3E}">
@@ -8259,6 +8560,129 @@
   <p:clrMapOvr>
     <a:masterClrMapping/>
   </p:clrMapOvr>
+  <p:timing>
+    <p:tnLst>
+      <p:par>
+        <p:cTn id="1" dur="indefinite" restart="never" nodeType="tmRoot">
+          <p:childTnLst>
+            <p:seq concurrent="1" nextAc="seek">
+              <p:cTn id="2" dur="indefinite" nodeType="mainSeq">
+                <p:childTnLst>
+                  <p:par>
+                    <p:cTn id="3" fill="hold">
+                      <p:stCondLst>
+                        <p:cond delay="indefinite"/>
+                      </p:stCondLst>
+                      <p:childTnLst>
+                        <p:par>
+                          <p:cTn id="4" fill="hold">
+                            <p:stCondLst>
+                              <p:cond delay="0"/>
+                            </p:stCondLst>
+                            <p:childTnLst>
+                              <p:par>
+                                <p:cTn id="5" presetID="1" presetClass="entr" presetSubtype="0" fill="hold" grpId="0" nodeType="clickEffect">
+                                  <p:stCondLst>
+                                    <p:cond delay="0"/>
+                                  </p:stCondLst>
+                                  <p:childTnLst>
+                                    <p:set>
+                                      <p:cBhvr>
+                                        <p:cTn id="6" dur="1" fill="hold">
+                                          <p:stCondLst>
+                                            <p:cond delay="0"/>
+                                          </p:stCondLst>
+                                        </p:cTn>
+                                        <p:tgtEl>
+                                          <p:spTgt spid="4"/>
+                                        </p:tgtEl>
+                                        <p:attrNameLst>
+                                          <p:attrName>style.visibility</p:attrName>
+                                        </p:attrNameLst>
+                                      </p:cBhvr>
+                                      <p:to>
+                                        <p:strVal val="visible"/>
+                                      </p:to>
+                                    </p:set>
+                                  </p:childTnLst>
+                                </p:cTn>
+                              </p:par>
+                            </p:childTnLst>
+                          </p:cTn>
+                        </p:par>
+                      </p:childTnLst>
+                    </p:cTn>
+                  </p:par>
+                  <p:par>
+                    <p:cTn id="7" fill="hold">
+                      <p:stCondLst>
+                        <p:cond delay="indefinite"/>
+                      </p:stCondLst>
+                      <p:childTnLst>
+                        <p:par>
+                          <p:cTn id="8" fill="hold">
+                            <p:stCondLst>
+                              <p:cond delay="0"/>
+                            </p:stCondLst>
+                            <p:childTnLst>
+                              <p:par>
+                                <p:cTn id="9" presetID="1" presetClass="entr" presetSubtype="0" fill="hold" nodeType="clickEffect">
+                                  <p:stCondLst>
+                                    <p:cond delay="0"/>
+                                  </p:stCondLst>
+                                  <p:childTnLst>
+                                    <p:set>
+                                      <p:cBhvr>
+                                        <p:cTn id="10" dur="1" fill="hold">
+                                          <p:stCondLst>
+                                            <p:cond delay="0"/>
+                                          </p:stCondLst>
+                                        </p:cTn>
+                                        <p:tgtEl>
+                                          <p:spTgt spid="5"/>
+                                        </p:tgtEl>
+                                        <p:attrNameLst>
+                                          <p:attrName>style.visibility</p:attrName>
+                                        </p:attrNameLst>
+                                      </p:cBhvr>
+                                      <p:to>
+                                        <p:strVal val="visible"/>
+                                      </p:to>
+                                    </p:set>
+                                  </p:childTnLst>
+                                </p:cTn>
+                              </p:par>
+                            </p:childTnLst>
+                          </p:cTn>
+                        </p:par>
+                      </p:childTnLst>
+                    </p:cTn>
+                  </p:par>
+                </p:childTnLst>
+              </p:cTn>
+              <p:prevCondLst>
+                <p:cond evt="onPrev" delay="0">
+                  <p:tgtEl>
+                    <p:sldTgt/>
+                  </p:tgtEl>
+                </p:cond>
+              </p:prevCondLst>
+              <p:nextCondLst>
+                <p:cond evt="onNext" delay="0">
+                  <p:tgtEl>
+                    <p:sldTgt/>
+                  </p:tgtEl>
+                </p:cond>
+              </p:nextCondLst>
+            </p:seq>
+          </p:childTnLst>
+        </p:cTn>
+      </p:par>
+    </p:tnLst>
+    <p:bldLst>
+      <p:bldP spid="4" grpId="0" animBg="1"/>
+    </p:bldLst>
+  </p:timing>
 </p:sld>
 </file>
 
@@ -8682,7 +9106,7 @@
           <p:cNvPr id="2" name="Title 1">
             <a:extLst>
               <a:ext uri="{FF2B5EF4-FFF2-40B4-BE49-F238E27FC236}">
-                <a16:creationId xmlns:a16="http://schemas.microsoft.com/office/drawing/2014/main" id="{1A5B3043-457C-D047-B9C5-0B4180C0E202}"/>
+                <a16:creationId xmlns:a16="http://schemas.microsoft.com/office/drawing/2014/main" id="{30DABD7D-833B-6148-8871-58C210D0EF27}"/>
               </a:ext>
             </a:extLst>
           </p:cNvPr>
@@ -8700,16 +9124,8 @@
           <a:p>
             <a:r>
               <a:rPr lang="en-US" dirty="0"/>
-              <a:t>Dangling DNS</a:t>
-            </a:r>
-            <a:br>
-              <a:rPr lang="en-US" dirty="0"/>
-            </a:br>
-            <a:r>
-              <a:rPr lang="en-AU" dirty="0"/>
-              <a:t>(The overly simplified example!)</a:t>
-            </a:r>
-            <a:endParaRPr lang="en-US" dirty="0"/>
+              <a:t>So, how do I prevent this?</a:t>
+            </a:r>
           </a:p>
         </p:txBody>
       </p:sp>
@@ -8718,7 +9134,7 @@
           <p:cNvPr id="3" name="Content Placeholder 2">
             <a:extLst>
               <a:ext uri="{FF2B5EF4-FFF2-40B4-BE49-F238E27FC236}">
-                <a16:creationId xmlns:a16="http://schemas.microsoft.com/office/drawing/2014/main" id="{59DEE64C-E59F-B349-AD32-A0103842CD6A}"/>
+                <a16:creationId xmlns:a16="http://schemas.microsoft.com/office/drawing/2014/main" id="{60E6392A-2923-0949-A8C2-08DB4403573E}"/>
               </a:ext>
             </a:extLst>
           </p:cNvPr>
@@ -8739,81 +9155,222 @@
             </a:pPr>
             <a:r>
               <a:rPr lang="en-US" dirty="0"/>
-              <a:t>Your create an Elastic IP (EIP) and associate it with an AWS resource</a:t>
+              <a:t>Route53 allows you to ‘lock’ your domain, preventing someone else from </a:t>
+            </a:r>
+            <a:r>
+              <a:rPr lang="en-AU" dirty="0"/>
+              <a:t>transferring the domain to another registrar without your permission.</a:t>
             </a:r>
           </a:p>
           <a:p>
             <a:pPr marL="0" indent="0">
               <a:buNone/>
             </a:pPr>
+            <a:endParaRPr lang="en-AU" dirty="0"/>
+          </a:p>
+          <a:p>
+            <a:pPr marL="0" indent="0">
+              <a:buNone/>
+            </a:pPr>
+            <a:r>
+              <a:rPr lang="en-AU" dirty="0"/>
+              <a:t>This can be done via the console </a:t>
+            </a:r>
             <a:endParaRPr lang="en-US" dirty="0"/>
           </a:p>
-          <a:p>
-            <a:pPr marL="0" indent="0">
-              <a:buNone/>
-            </a:pPr>
+        </p:txBody>
+      </p:sp>
+      <p:pic>
+        <p:nvPicPr>
+          <p:cNvPr id="5" name="Picture 4">
+            <a:extLst>
+              <a:ext uri="{FF2B5EF4-FFF2-40B4-BE49-F238E27FC236}">
+                <a16:creationId xmlns:a16="http://schemas.microsoft.com/office/drawing/2014/main" id="{FE38EA5C-40BF-6048-AF61-428D7E66D412}"/>
+              </a:ext>
+            </a:extLst>
+          </p:cNvPr>
+          <p:cNvPicPr>
+            <a:picLocks noChangeAspect="1"/>
+          </p:cNvPicPr>
+          <p:nvPr/>
+        </p:nvPicPr>
+        <p:blipFill>
+          <a:blip r:embed="rId3"/>
+          <a:stretch>
+            <a:fillRect/>
+          </a:stretch>
+        </p:blipFill>
+        <p:spPr>
+          <a:xfrm>
+            <a:off x="6744182" y="4350393"/>
+            <a:ext cx="4368800" cy="495300"/>
+          </a:xfrm>
+          <a:prstGeom prst="rect">
+            <a:avLst/>
+          </a:prstGeom>
+        </p:spPr>
+      </p:pic>
+      <p:sp>
+        <p:nvSpPr>
+          <p:cNvPr id="6" name="Right Arrow 5">
+            <a:extLst>
+              <a:ext uri="{FF2B5EF4-FFF2-40B4-BE49-F238E27FC236}">
+                <a16:creationId xmlns:a16="http://schemas.microsoft.com/office/drawing/2014/main" id="{FDE54907-A2B7-4D49-923D-4469FD401070}"/>
+              </a:ext>
+            </a:extLst>
+          </p:cNvPr>
+          <p:cNvSpPr/>
+          <p:nvPr/>
+        </p:nvSpPr>
+        <p:spPr>
+          <a:xfrm>
+            <a:off x="5013893" y="4414898"/>
+            <a:ext cx="1469985" cy="366290"/>
+          </a:xfrm>
+          <a:prstGeom prst="rightArrow">
+            <a:avLst/>
+          </a:prstGeom>
+        </p:spPr>
+        <p:style>
+          <a:lnRef idx="2">
+            <a:schemeClr val="accent1">
+              <a:shade val="50000"/>
+            </a:schemeClr>
+          </a:lnRef>
+          <a:fillRef idx="1">
+            <a:schemeClr val="accent1"/>
+          </a:fillRef>
+          <a:effectRef idx="0">
+            <a:schemeClr val="accent1"/>
+          </a:effectRef>
+          <a:fontRef idx="minor">
+            <a:schemeClr val="lt1"/>
+          </a:fontRef>
+        </p:style>
+        <p:txBody>
+          <a:bodyPr rtlCol="0" anchor="ctr"/>
+          <a:lstStyle/>
+          <a:p>
+            <a:pPr algn="ctr"/>
+            <a:endParaRPr lang="en-US"/>
+          </a:p>
+        </p:txBody>
+      </p:sp>
+      <p:sp>
+        <p:nvSpPr>
+          <p:cNvPr id="7" name="TextBox 6">
+            <a:extLst>
+              <a:ext uri="{FF2B5EF4-FFF2-40B4-BE49-F238E27FC236}">
+                <a16:creationId xmlns:a16="http://schemas.microsoft.com/office/drawing/2014/main" id="{D3941B86-51F3-FE47-9FA8-B37C64B9725D}"/>
+              </a:ext>
+            </a:extLst>
+          </p:cNvPr>
+          <p:cNvSpPr txBox="1"/>
+          <p:nvPr/>
+        </p:nvSpPr>
+        <p:spPr>
+          <a:xfrm>
+            <a:off x="810000" y="5208608"/>
+            <a:ext cx="3871573" cy="369332"/>
+          </a:xfrm>
+          <a:prstGeom prst="rect">
+            <a:avLst/>
+          </a:prstGeom>
+          <a:noFill/>
+        </p:spPr>
+        <p:txBody>
+          <a:bodyPr wrap="none" rtlCol="0">
+            <a:spAutoFit/>
+          </a:bodyPr>
+          <a:lstStyle/>
+          <a:p>
             <a:r>
               <a:rPr lang="en-US" dirty="0"/>
-              <a:t>You update your hosted zone and add a record for </a:t>
-            </a:r>
-            <a:r>
-              <a:rPr lang="en-US" dirty="0" err="1"/>
-              <a:t>example.awesome-website.com</a:t>
-            </a:r>
-            <a:r>
-              <a:rPr lang="en-US" dirty="0"/>
-              <a:t> to point to your EIP</a:t>
-            </a:r>
-          </a:p>
-          <a:p>
-            <a:pPr marL="0" indent="0">
-              <a:buNone/>
-            </a:pPr>
-            <a:endParaRPr lang="en-US" dirty="0"/>
-          </a:p>
-          <a:p>
-            <a:pPr marL="0" indent="0">
-              <a:buNone/>
-            </a:pPr>
-            <a:r>
-              <a:rPr lang="en-US" dirty="0"/>
-              <a:t>You delete the EIP and it goes back into the AWS pool of </a:t>
-            </a:r>
-            <a:r>
-              <a:rPr lang="en-US" dirty="0" err="1"/>
-              <a:t>Ips</a:t>
-            </a:r>
-            <a:r>
-              <a:rPr lang="en-US" dirty="0"/>
-              <a:t> (and now it’s up for grabs!)</a:t>
-            </a:r>
-          </a:p>
-          <a:p>
-            <a:pPr marL="0" indent="0">
-              <a:buNone/>
-            </a:pPr>
-            <a:endParaRPr lang="en-US" dirty="0"/>
-          </a:p>
-          <a:p>
-            <a:pPr marL="0" indent="0">
-              <a:buNone/>
-            </a:pPr>
-            <a:r>
-              <a:rPr lang="en-US" dirty="0"/>
-              <a:t>Someone else 🦹🏻‍♀️ gets allocated your deleted IP and now they can take over your </a:t>
-            </a:r>
-            <a:r>
-              <a:rPr lang="en-US" dirty="0" err="1"/>
-              <a:t>example.awesome-website.com</a:t>
-            </a:r>
-            <a:endParaRPr lang="en-US" dirty="0"/>
+              <a:t>You can also enable auto-renew</a:t>
+            </a:r>
+          </a:p>
+        </p:txBody>
+      </p:sp>
+      <p:pic>
+        <p:nvPicPr>
+          <p:cNvPr id="9" name="Picture 8" descr="A picture containing table&#10;&#10;Description automatically generated">
+            <a:extLst>
+              <a:ext uri="{FF2B5EF4-FFF2-40B4-BE49-F238E27FC236}">
+                <a16:creationId xmlns:a16="http://schemas.microsoft.com/office/drawing/2014/main" id="{D1203E3B-C035-444D-8A77-0D5800F134CC}"/>
+              </a:ext>
+            </a:extLst>
+          </p:cNvPr>
+          <p:cNvPicPr>
+            <a:picLocks noChangeAspect="1"/>
+          </p:cNvPicPr>
+          <p:nvPr/>
+        </p:nvPicPr>
+        <p:blipFill>
+          <a:blip r:embed="rId4"/>
+          <a:stretch>
+            <a:fillRect/>
+          </a:stretch>
+        </p:blipFill>
+        <p:spPr>
+          <a:xfrm>
+            <a:off x="7226782" y="5208608"/>
+            <a:ext cx="3403600" cy="533400"/>
+          </a:xfrm>
+          <a:prstGeom prst="rect">
+            <a:avLst/>
+          </a:prstGeom>
+        </p:spPr>
+      </p:pic>
+      <p:sp>
+        <p:nvSpPr>
+          <p:cNvPr id="10" name="Right Arrow 9">
+            <a:extLst>
+              <a:ext uri="{FF2B5EF4-FFF2-40B4-BE49-F238E27FC236}">
+                <a16:creationId xmlns:a16="http://schemas.microsoft.com/office/drawing/2014/main" id="{C63D594C-2BD6-F044-827F-FCD1E695D278}"/>
+              </a:ext>
+            </a:extLst>
+          </p:cNvPr>
+          <p:cNvSpPr/>
+          <p:nvPr/>
+        </p:nvSpPr>
+        <p:spPr>
+          <a:xfrm>
+            <a:off x="5011466" y="5220391"/>
+            <a:ext cx="1469985" cy="366290"/>
+          </a:xfrm>
+          <a:prstGeom prst="rightArrow">
+            <a:avLst/>
+          </a:prstGeom>
+        </p:spPr>
+        <p:style>
+          <a:lnRef idx="2">
+            <a:schemeClr val="accent1">
+              <a:shade val="50000"/>
+            </a:schemeClr>
+          </a:lnRef>
+          <a:fillRef idx="1">
+            <a:schemeClr val="accent1"/>
+          </a:fillRef>
+          <a:effectRef idx="0">
+            <a:schemeClr val="accent1"/>
+          </a:effectRef>
+          <a:fontRef idx="minor">
+            <a:schemeClr val="lt1"/>
+          </a:fontRef>
+        </p:style>
+        <p:txBody>
+          <a:bodyPr rtlCol="0" anchor="ctr"/>
+          <a:lstStyle/>
+          <a:p>
+            <a:pPr algn="ctr"/>
+            <a:endParaRPr lang="en-US"/>
           </a:p>
         </p:txBody>
       </p:sp>
     </p:spTree>
     <p:extLst>
       <p:ext uri="{BB962C8B-B14F-4D97-AF65-F5344CB8AC3E}">
-        <p14:creationId xmlns:p14="http://schemas.microsoft.com/office/powerpoint/2010/main" val="2987921331"/>
+        <p14:creationId xmlns:p14="http://schemas.microsoft.com/office/powerpoint/2010/main" val="1240714092"/>
       </p:ext>
     </p:extLst>
   </p:cSld>
@@ -8845,7 +9402,7 @@
           <p:cNvPr id="2" name="Title 1">
             <a:extLst>
               <a:ext uri="{FF2B5EF4-FFF2-40B4-BE49-F238E27FC236}">
-                <a16:creationId xmlns:a16="http://schemas.microsoft.com/office/drawing/2014/main" id="{30DABD7D-833B-6148-8871-58C210D0EF27}"/>
+                <a16:creationId xmlns:a16="http://schemas.microsoft.com/office/drawing/2014/main" id="{1A5B3043-457C-D047-B9C5-0B4180C0E202}"/>
               </a:ext>
             </a:extLst>
           </p:cNvPr>
@@ -8863,8 +9420,16 @@
           <a:p>
             <a:r>
               <a:rPr lang="en-US" dirty="0"/>
-              <a:t>So, how do I prevent all this?</a:t>
-            </a:r>
+              <a:t>Dangling DNS - EIP</a:t>
+            </a:r>
+            <a:br>
+              <a:rPr lang="en-US" dirty="0"/>
+            </a:br>
+            <a:r>
+              <a:rPr lang="en-AU" dirty="0"/>
+              <a:t>(The overly simplified example!)</a:t>
+            </a:r>
+            <a:endParaRPr lang="en-US" dirty="0"/>
           </a:p>
         </p:txBody>
       </p:sp>
@@ -8873,7 +9438,7 @@
           <p:cNvPr id="3" name="Content Placeholder 2">
             <a:extLst>
               <a:ext uri="{FF2B5EF4-FFF2-40B4-BE49-F238E27FC236}">
-                <a16:creationId xmlns:a16="http://schemas.microsoft.com/office/drawing/2014/main" id="{60E6392A-2923-0949-A8C2-08DB4403573E}"/>
+                <a16:creationId xmlns:a16="http://schemas.microsoft.com/office/drawing/2014/main" id="{59DEE64C-E59F-B349-AD32-A0103842CD6A}"/>
               </a:ext>
             </a:extLst>
           </p:cNvPr>
@@ -8889,14 +9454,303 @@
           <a:bodyPr/>
           <a:lstStyle/>
           <a:p>
-            <a:endParaRPr lang="en-US"/>
+            <a:pPr marL="0" indent="0">
+              <a:buNone/>
+            </a:pPr>
+            <a:r>
+              <a:rPr lang="en-US" dirty="0"/>
+              <a:t>Your create an Elastic IP (EIP) and associate it with an AWS resource</a:t>
+            </a:r>
+          </a:p>
+          <a:p>
+            <a:pPr marL="0" indent="0">
+              <a:buNone/>
+            </a:pPr>
+            <a:endParaRPr lang="en-US" dirty="0"/>
+          </a:p>
+          <a:p>
+            <a:pPr marL="0" indent="0">
+              <a:buNone/>
+            </a:pPr>
+            <a:r>
+              <a:rPr lang="en-US" dirty="0"/>
+              <a:t>You update your hosted zone and add a record for </a:t>
+            </a:r>
+            <a:r>
+              <a:rPr lang="en-US" dirty="0" err="1"/>
+              <a:t>example.awesome-website.com</a:t>
+            </a:r>
+            <a:r>
+              <a:rPr lang="en-US" dirty="0"/>
+              <a:t> to point to your EIP</a:t>
+            </a:r>
+          </a:p>
+          <a:p>
+            <a:pPr marL="0" indent="0">
+              <a:buNone/>
+            </a:pPr>
+            <a:endParaRPr lang="en-US" dirty="0"/>
+          </a:p>
+          <a:p>
+            <a:pPr marL="0" indent="0">
+              <a:buNone/>
+            </a:pPr>
+            <a:r>
+              <a:rPr lang="en-US" dirty="0"/>
+              <a:t>You delete the EIP and it goes back into the AWS pool of IPs (and now it’s up for grabs!)</a:t>
+            </a:r>
+          </a:p>
+          <a:p>
+            <a:pPr marL="0" indent="0">
+              <a:buNone/>
+            </a:pPr>
+            <a:endParaRPr lang="en-US" dirty="0"/>
+          </a:p>
+          <a:p>
+            <a:pPr marL="0" indent="0">
+              <a:buNone/>
+            </a:pPr>
+            <a:r>
+              <a:rPr lang="en-US" dirty="0"/>
+              <a:t>Someone else 🦹🏻‍♀️ gets allocated your deleted IP and now they can take over your </a:t>
+            </a:r>
+            <a:r>
+              <a:rPr lang="en-US" dirty="0" err="1"/>
+              <a:t>example.awesome-website.com</a:t>
+            </a:r>
+            <a:endParaRPr lang="en-US" dirty="0"/>
           </a:p>
         </p:txBody>
       </p:sp>
     </p:spTree>
     <p:extLst>
       <p:ext uri="{BB962C8B-B14F-4D97-AF65-F5344CB8AC3E}">
-        <p14:creationId xmlns:p14="http://schemas.microsoft.com/office/powerpoint/2010/main" val="1240714092"/>
+        <p14:creationId xmlns:p14="http://schemas.microsoft.com/office/powerpoint/2010/main" val="2987921331"/>
+      </p:ext>
+    </p:extLst>
+  </p:cSld>
+  <p:clrMapOvr>
+    <a:masterClrMapping/>
+  </p:clrMapOvr>
+</p:sld>
+</file>
+
+<file path=ppt/slides/slide9.xml><?xml version="1.0" encoding="utf-8"?>
+<p:sld xmlns:a="http://schemas.openxmlformats.org/drawingml/2006/main" xmlns:r="http://schemas.openxmlformats.org/officeDocument/2006/relationships" xmlns:p="http://schemas.openxmlformats.org/presentationml/2006/main">
+  <p:cSld>
+    <p:spTree>
+      <p:nvGrpSpPr>
+        <p:cNvPr id="1" name=""/>
+        <p:cNvGrpSpPr/>
+        <p:nvPr/>
+      </p:nvGrpSpPr>
+      <p:grpSpPr>
+        <a:xfrm>
+          <a:off x="0" y="0"/>
+          <a:ext cx="0" cy="0"/>
+          <a:chOff x="0" y="0"/>
+          <a:chExt cx="0" cy="0"/>
+        </a:xfrm>
+      </p:grpSpPr>
+      <p:sp>
+        <p:nvSpPr>
+          <p:cNvPr id="2" name="Title 1">
+            <a:extLst>
+              <a:ext uri="{FF2B5EF4-FFF2-40B4-BE49-F238E27FC236}">
+                <a16:creationId xmlns:a16="http://schemas.microsoft.com/office/drawing/2014/main" id="{1A5B3043-457C-D047-B9C5-0B4180C0E202}"/>
+              </a:ext>
+            </a:extLst>
+          </p:cNvPr>
+          <p:cNvSpPr>
+            <a:spLocks noGrp="1"/>
+          </p:cNvSpPr>
+          <p:nvPr>
+            <p:ph type="title"/>
+          </p:nvPr>
+        </p:nvSpPr>
+        <p:spPr/>
+        <p:txBody>
+          <a:bodyPr/>
+          <a:lstStyle/>
+          <a:p>
+            <a:r>
+              <a:rPr lang="en-US" dirty="0"/>
+              <a:t>Dangling DNS – s3</a:t>
+            </a:r>
+            <a:br>
+              <a:rPr lang="en-US" dirty="0"/>
+            </a:br>
+            <a:r>
+              <a:rPr lang="en-AU" dirty="0"/>
+              <a:t>(The overly simplified example!)</a:t>
+            </a:r>
+            <a:endParaRPr lang="en-US" dirty="0"/>
+          </a:p>
+        </p:txBody>
+      </p:sp>
+      <p:sp>
+        <p:nvSpPr>
+          <p:cNvPr id="3" name="Content Placeholder 2">
+            <a:extLst>
+              <a:ext uri="{FF2B5EF4-FFF2-40B4-BE49-F238E27FC236}">
+                <a16:creationId xmlns:a16="http://schemas.microsoft.com/office/drawing/2014/main" id="{59DEE64C-E59F-B349-AD32-A0103842CD6A}"/>
+              </a:ext>
+            </a:extLst>
+          </p:cNvPr>
+          <p:cNvSpPr>
+            <a:spLocks noGrp="1"/>
+          </p:cNvSpPr>
+          <p:nvPr>
+            <p:ph idx="1"/>
+          </p:nvPr>
+        </p:nvSpPr>
+        <p:spPr>
+          <a:xfrm>
+            <a:off x="818712" y="2222287"/>
+            <a:ext cx="10554574" cy="4340559"/>
+          </a:xfrm>
+        </p:spPr>
+        <p:txBody>
+          <a:bodyPr>
+            <a:normAutofit/>
+          </a:bodyPr>
+          <a:lstStyle/>
+          <a:p>
+            <a:pPr marL="0" indent="0">
+              <a:buNone/>
+            </a:pPr>
+            <a:r>
+              <a:rPr lang="en-US" dirty="0"/>
+              <a:t>You create an s3 bucket for webhosting and associate it with </a:t>
+            </a:r>
+            <a:r>
+              <a:rPr lang="en-US" dirty="0" err="1"/>
+              <a:t>Cloudfront</a:t>
+            </a:r>
+            <a:endParaRPr lang="en-US" dirty="0"/>
+          </a:p>
+          <a:p>
+            <a:pPr marL="0" indent="0">
+              <a:buNone/>
+            </a:pPr>
+            <a:endParaRPr lang="en-US" dirty="0"/>
+          </a:p>
+          <a:p>
+            <a:pPr marL="0" indent="0">
+              <a:buNone/>
+            </a:pPr>
+            <a:r>
+              <a:rPr lang="en-US" dirty="0"/>
+              <a:t>You update your hosted zone and add a record for </a:t>
+            </a:r>
+            <a:r>
+              <a:rPr lang="en-US" dirty="0" err="1"/>
+              <a:t>example.awesome-website.com</a:t>
+            </a:r>
+            <a:r>
+              <a:rPr lang="en-US" dirty="0"/>
+              <a:t> to point to your </a:t>
+            </a:r>
+            <a:r>
+              <a:rPr lang="en-US" dirty="0" err="1"/>
+              <a:t>Cloudfront</a:t>
+            </a:r>
+            <a:r>
+              <a:rPr lang="en-US" dirty="0"/>
+              <a:t> DNS</a:t>
+            </a:r>
+          </a:p>
+          <a:p>
+            <a:pPr marL="0" indent="0">
+              <a:buNone/>
+            </a:pPr>
+            <a:endParaRPr lang="en-US" dirty="0"/>
+          </a:p>
+          <a:p>
+            <a:pPr marL="0" indent="0">
+              <a:buNone/>
+            </a:pPr>
+            <a:r>
+              <a:rPr lang="en-US" dirty="0"/>
+              <a:t>You delete the s3 bucket and </a:t>
+            </a:r>
+          </a:p>
+          <a:p>
+            <a:pPr marL="0" indent="0">
+              <a:buNone/>
+            </a:pPr>
+            <a:r>
+              <a:rPr lang="en-US" dirty="0"/>
+              <a:t>now people see this message:</a:t>
+            </a:r>
+          </a:p>
+          <a:p>
+            <a:pPr marL="0" indent="0">
+              <a:buNone/>
+            </a:pPr>
+            <a:endParaRPr lang="en-US" dirty="0"/>
+          </a:p>
+          <a:p>
+            <a:pPr marL="0" indent="0">
+              <a:buNone/>
+            </a:pPr>
+            <a:r>
+              <a:rPr lang="en-US" dirty="0"/>
+              <a:t>Someone else 🦹🏻‍♀️ creates their own bucket with the same name and </a:t>
+            </a:r>
+            <a:r>
+              <a:rPr lang="en-US" dirty="0" err="1"/>
+              <a:t>Cloudfront</a:t>
+            </a:r>
+            <a:r>
+              <a:rPr lang="en-US" dirty="0"/>
+              <a:t> picks that up and now </a:t>
+            </a:r>
+            <a:r>
+              <a:rPr lang="en-US" dirty="0" err="1"/>
+              <a:t>example.awesome-website.com</a:t>
+            </a:r>
+            <a:r>
+              <a:rPr lang="en-US" dirty="0"/>
+              <a:t> is displaying a malicious site 😈</a:t>
+            </a:r>
+          </a:p>
+        </p:txBody>
+      </p:sp>
+      <p:pic>
+        <p:nvPicPr>
+          <p:cNvPr id="4" name="Picture 3">
+            <a:extLst>
+              <a:ext uri="{FF2B5EF4-FFF2-40B4-BE49-F238E27FC236}">
+                <a16:creationId xmlns:a16="http://schemas.microsoft.com/office/drawing/2014/main" id="{99F01F02-2916-5948-8073-2A9012B80186}"/>
+              </a:ext>
+            </a:extLst>
+          </p:cNvPr>
+          <p:cNvPicPr>
+            <a:picLocks noChangeAspect="1"/>
+          </p:cNvPicPr>
+          <p:nvPr/>
+        </p:nvPicPr>
+        <p:blipFill>
+          <a:blip r:embed="rId3"/>
+          <a:stretch>
+            <a:fillRect/>
+          </a:stretch>
+        </p:blipFill>
+        <p:spPr>
+          <a:xfrm>
+            <a:off x="4726328" y="3886441"/>
+            <a:ext cx="6096000" cy="1562100"/>
+          </a:xfrm>
+          <a:prstGeom prst="rect">
+            <a:avLst/>
+          </a:prstGeom>
+        </p:spPr>
+      </p:pic>
+    </p:spTree>
+    <p:extLst>
+      <p:ext uri="{BB962C8B-B14F-4D97-AF65-F5344CB8AC3E}">
+        <p14:creationId xmlns:p14="http://schemas.microsoft.com/office/powerpoint/2010/main" val="2769968670"/>
       </p:ext>
     </p:extLst>
   </p:cSld>

</xml_diff>

<commit_message>
clean up and 99% done
</commit_message>
<xml_diff>
--- a/day-1/route53.pptx
+++ b/day-1/route53.pptx
@@ -1059,270 +1059,12 @@
           <a:p>
             <a:r>
               <a:rPr lang="en-US" dirty="0"/>
-              <a:t>More detail on the HOW?</a:t>
-            </a:r>
-          </a:p>
-          <a:p>
-            <a:endParaRPr lang="en-US" dirty="0"/>
-          </a:p>
-          <a:p>
-            <a:r>
-              <a:rPr lang="en-AU" sz="1200" b="0" kern="1200" dirty="0">
-                <a:solidFill>
-                  <a:schemeClr val="tx1"/>
-                </a:solidFill>
-                <a:effectLst/>
-                <a:latin typeface="+mn-lt"/>
-                <a:ea typeface="+mn-ea"/>
-                <a:cs typeface="+mn-cs"/>
-              </a:rPr>
-              <a:t>[Basics (beginner friendly-</a:t>
-            </a:r>
-            <a:r>
-              <a:rPr lang="en-AU" sz="1200" b="0" kern="1200" dirty="0" err="1">
-                <a:solidFill>
-                  <a:schemeClr val="tx1"/>
-                </a:solidFill>
-                <a:effectLst/>
-                <a:latin typeface="+mn-lt"/>
-                <a:ea typeface="+mn-ea"/>
-                <a:cs typeface="+mn-cs"/>
-              </a:rPr>
-              <a:t>ish</a:t>
-            </a:r>
-            <a:r>
-              <a:rPr lang="en-AU" sz="1200" b="0" kern="1200" dirty="0">
-                <a:solidFill>
-                  <a:schemeClr val="tx1"/>
-                </a:solidFill>
-                <a:effectLst/>
-                <a:latin typeface="+mn-lt"/>
-                <a:ea typeface="+mn-ea"/>
-                <a:cs typeface="+mn-cs"/>
-              </a:rPr>
-              <a:t>)](</a:t>
-            </a:r>
-            <a:r>
-              <a:rPr lang="en-AU" sz="1200" b="0" u="sng" kern="1200" dirty="0">
-                <a:solidFill>
-                  <a:schemeClr val="tx1"/>
-                </a:solidFill>
-                <a:effectLst/>
-                <a:latin typeface="+mn-lt"/>
-                <a:ea typeface="+mn-ea"/>
-                <a:cs typeface="+mn-cs"/>
-              </a:rPr>
-              <a:t>https://0xpatrik.com/subdomain-takeover-basics/</a:t>
-            </a:r>
-            <a:r>
-              <a:rPr lang="en-AU" sz="1200" b="0" kern="1200" dirty="0">
-                <a:solidFill>
-                  <a:schemeClr val="tx1"/>
-                </a:solidFill>
-                <a:effectLst/>
-                <a:latin typeface="+mn-lt"/>
-                <a:ea typeface="+mn-ea"/>
-                <a:cs typeface="+mn-cs"/>
-              </a:rPr>
-              <a:t>)</a:t>
-            </a:r>
-          </a:p>
-          <a:p>
-            <a:br>
-              <a:rPr lang="en-AU" sz="1200" b="0" kern="1200" dirty="0">
-                <a:solidFill>
-                  <a:schemeClr val="tx1"/>
-                </a:solidFill>
-                <a:effectLst/>
-                <a:latin typeface="+mn-lt"/>
-                <a:ea typeface="+mn-ea"/>
-                <a:cs typeface="+mn-cs"/>
-              </a:rPr>
-            </a:br>
-            <a:r>
-              <a:rPr lang="en-AU" sz="1200" b="0" kern="1200" dirty="0">
-                <a:solidFill>
-                  <a:schemeClr val="tx1"/>
-                </a:solidFill>
-                <a:effectLst/>
-                <a:latin typeface="+mn-lt"/>
-                <a:ea typeface="+mn-ea"/>
-                <a:cs typeface="+mn-cs"/>
-              </a:rPr>
-              <a:t>[Subdomain takeover](</a:t>
-            </a:r>
-            <a:r>
-              <a:rPr lang="en-AU" sz="1200" b="0" u="sng" kern="1200" dirty="0">
-                <a:solidFill>
-                  <a:schemeClr val="tx1"/>
-                </a:solidFill>
-                <a:effectLst/>
-                <a:latin typeface="+mn-lt"/>
-                <a:ea typeface="+mn-ea"/>
-                <a:cs typeface="+mn-cs"/>
-              </a:rPr>
-              <a:t>https://</a:t>
-            </a:r>
-            <a:r>
-              <a:rPr lang="en-AU" sz="1200" b="0" u="sng" kern="1200" dirty="0" err="1">
-                <a:solidFill>
-                  <a:schemeClr val="tx1"/>
-                </a:solidFill>
-                <a:effectLst/>
-                <a:latin typeface="+mn-lt"/>
-                <a:ea typeface="+mn-ea"/>
-                <a:cs typeface="+mn-cs"/>
-              </a:rPr>
-              <a:t>www.hackerone.com</a:t>
-            </a:r>
-            <a:r>
-              <a:rPr lang="en-AU" sz="1200" b="0" u="sng" kern="1200" dirty="0">
-                <a:solidFill>
-                  <a:schemeClr val="tx1"/>
-                </a:solidFill>
-                <a:effectLst/>
-                <a:latin typeface="+mn-lt"/>
-                <a:ea typeface="+mn-ea"/>
-                <a:cs typeface="+mn-cs"/>
-              </a:rPr>
-              <a:t>/blog/Guide-Subdomain-Takeovers</a:t>
-            </a:r>
-            <a:r>
-              <a:rPr lang="en-AU" sz="1200" b="0" kern="1200" dirty="0">
-                <a:solidFill>
-                  <a:schemeClr val="tx1"/>
-                </a:solidFill>
-                <a:effectLst/>
-                <a:latin typeface="+mn-lt"/>
-                <a:ea typeface="+mn-ea"/>
-                <a:cs typeface="+mn-cs"/>
-              </a:rPr>
-              <a:t>)</a:t>
-            </a:r>
-          </a:p>
-          <a:p>
-            <a:br>
-              <a:rPr lang="en-AU" sz="1200" b="0" kern="1200" dirty="0">
-                <a:solidFill>
-                  <a:schemeClr val="tx1"/>
-                </a:solidFill>
-                <a:effectLst/>
-                <a:latin typeface="+mn-lt"/>
-                <a:ea typeface="+mn-ea"/>
-                <a:cs typeface="+mn-cs"/>
-              </a:rPr>
-            </a:br>
-            <a:r>
-              <a:rPr lang="en-AU" sz="1200" b="0" kern="1200" dirty="0">
-                <a:solidFill>
-                  <a:schemeClr val="tx1"/>
-                </a:solidFill>
-                <a:effectLst/>
-                <a:latin typeface="+mn-lt"/>
-                <a:ea typeface="+mn-ea"/>
-                <a:cs typeface="+mn-cs"/>
-              </a:rPr>
-              <a:t>[NS takeover](</a:t>
-            </a:r>
-            <a:r>
-              <a:rPr lang="en-AU" sz="1200" b="0" u="sng" kern="1200" dirty="0">
-                <a:solidFill>
-                  <a:schemeClr val="tx1"/>
-                </a:solidFill>
-                <a:effectLst/>
-                <a:latin typeface="+mn-lt"/>
-                <a:ea typeface="+mn-ea"/>
-                <a:cs typeface="+mn-cs"/>
-              </a:rPr>
-              <a:t>https://0xpatrik.com/subdomain-takeover-ns/</a:t>
-            </a:r>
-            <a:r>
-              <a:rPr lang="en-AU" sz="1200" b="0" kern="1200" dirty="0">
-                <a:solidFill>
-                  <a:schemeClr val="tx1"/>
-                </a:solidFill>
-                <a:effectLst/>
-                <a:latin typeface="+mn-lt"/>
-                <a:ea typeface="+mn-ea"/>
-                <a:cs typeface="+mn-cs"/>
-              </a:rPr>
-              <a:t>)</a:t>
-            </a:r>
-          </a:p>
-          <a:p>
-            <a:br>
-              <a:rPr lang="en-AU" sz="1200" b="0" kern="1200" dirty="0">
-                <a:solidFill>
-                  <a:schemeClr val="tx1"/>
-                </a:solidFill>
-                <a:effectLst/>
-                <a:latin typeface="+mn-lt"/>
-                <a:ea typeface="+mn-ea"/>
-                <a:cs typeface="+mn-cs"/>
-              </a:rPr>
-            </a:br>
-            <a:r>
-              <a:rPr lang="en-AU" sz="1200" b="0" kern="1200" dirty="0">
-                <a:solidFill>
-                  <a:schemeClr val="tx1"/>
-                </a:solidFill>
-                <a:effectLst/>
-                <a:latin typeface="+mn-lt"/>
-                <a:ea typeface="+mn-ea"/>
-                <a:cs typeface="+mn-cs"/>
-              </a:rPr>
-              <a:t>[Detailed write-up](</a:t>
-            </a:r>
-            <a:r>
-              <a:rPr lang="en-AU" sz="1200" b="0" u="sng" kern="1200" dirty="0">
-                <a:solidFill>
-                  <a:schemeClr val="tx1"/>
-                </a:solidFill>
-                <a:effectLst/>
-                <a:latin typeface="+mn-lt"/>
-                <a:ea typeface="+mn-ea"/>
-                <a:cs typeface="+mn-cs"/>
-              </a:rPr>
-              <a:t>https://</a:t>
-            </a:r>
-            <a:r>
-              <a:rPr lang="en-AU" sz="1200" b="0" u="sng" kern="1200" dirty="0" err="1">
-                <a:solidFill>
-                  <a:schemeClr val="tx1"/>
-                </a:solidFill>
-                <a:effectLst/>
-                <a:latin typeface="+mn-lt"/>
-                <a:ea typeface="+mn-ea"/>
-                <a:cs typeface="+mn-cs"/>
-              </a:rPr>
-              <a:t>thehackerblog.com</a:t>
-            </a:r>
-            <a:r>
-              <a:rPr lang="en-AU" sz="1200" b="0" u="sng" kern="1200" dirty="0">
-                <a:solidFill>
-                  <a:schemeClr val="tx1"/>
-                </a:solidFill>
-                <a:effectLst/>
-                <a:latin typeface="+mn-lt"/>
-                <a:ea typeface="+mn-ea"/>
-                <a:cs typeface="+mn-cs"/>
-              </a:rPr>
-              <a:t>/the-orphaned-internet-taking-over-120k-domains-via-a-dns-vulnerability-in-aws-google-cloud-rackspace-and-digital-ocean/</a:t>
-            </a:r>
-            <a:r>
-              <a:rPr lang="en-AU" sz="1200" b="0" kern="1200" dirty="0">
-                <a:solidFill>
-                  <a:schemeClr val="tx1"/>
-                </a:solidFill>
-                <a:effectLst/>
-                <a:latin typeface="+mn-lt"/>
-                <a:ea typeface="+mn-ea"/>
-                <a:cs typeface="+mn-cs"/>
-              </a:rPr>
-              <a:t>)</a:t>
-            </a:r>
-          </a:p>
-          <a:p>
+              <a:t>If your domain is in amazon, your NS will in amazon </a:t>
+            </a:r>
+            <a:r>
+              <a:rPr lang="en-US" dirty="0" err="1"/>
+              <a:t>etc</a:t>
+            </a:r>
             <a:endParaRPr lang="en-US" dirty="0"/>
           </a:p>
         </p:txBody>
@@ -1342,9 +1084,9 @@
           <a:bodyPr/>
           <a:lstStyle/>
           <a:p>
-            <a:fld id="{1EAEF871-98C5-8C4A-BC92-759A8CBA21D0}" type="slidenum">
+            <a:fld id="{2B40201D-7602-074C-A878-E3718E537E14}" type="slidenum">
               <a:rPr lang="en-US" smtClean="0"/>
-              <a:t>6</a:t>
+              <a:t>5</a:t>
             </a:fld>
             <a:endParaRPr lang="en-US"/>
           </a:p>
@@ -1353,7 +1095,7 @@
     </p:spTree>
     <p:extLst>
       <p:ext uri="{BB962C8B-B14F-4D97-AF65-F5344CB8AC3E}">
-        <p14:creationId xmlns:p14="http://schemas.microsoft.com/office/powerpoint/2010/main" val="2710125609"/>
+        <p14:creationId xmlns:p14="http://schemas.microsoft.com/office/powerpoint/2010/main" val="2395986127"/>
       </p:ext>
     </p:extLst>
   </p:cSld>
@@ -1408,11 +1150,271 @@
           <a:lstStyle/>
           <a:p>
             <a:r>
-              <a:rPr lang="en-AU" dirty="0">
-                <a:hlinkClick r:id="rId3"/>
+              <a:rPr lang="en-US" dirty="0"/>
+              <a:t>More detail on the HOW?</a:t>
+            </a:r>
+          </a:p>
+          <a:p>
+            <a:endParaRPr lang="en-US" dirty="0"/>
+          </a:p>
+          <a:p>
+            <a:r>
+              <a:rPr lang="en-AU" sz="1200" b="0" kern="1200" dirty="0">
+                <a:solidFill>
+                  <a:schemeClr val="tx1"/>
+                </a:solidFill>
+                <a:effectLst/>
+                <a:latin typeface="+mn-lt"/>
+                <a:ea typeface="+mn-ea"/>
+                <a:cs typeface="+mn-cs"/>
               </a:rPr>
-              <a:t>https://docs.aws.amazon.com/Route53/latest/DeveloperGuide/domain-lock.html</a:t>
-            </a:r>
+              <a:t>[Basics (beginner friendly-</a:t>
+            </a:r>
+            <a:r>
+              <a:rPr lang="en-AU" sz="1200" b="0" kern="1200" dirty="0" err="1">
+                <a:solidFill>
+                  <a:schemeClr val="tx1"/>
+                </a:solidFill>
+                <a:effectLst/>
+                <a:latin typeface="+mn-lt"/>
+                <a:ea typeface="+mn-ea"/>
+                <a:cs typeface="+mn-cs"/>
+              </a:rPr>
+              <a:t>ish</a:t>
+            </a:r>
+            <a:r>
+              <a:rPr lang="en-AU" sz="1200" b="0" kern="1200" dirty="0">
+                <a:solidFill>
+                  <a:schemeClr val="tx1"/>
+                </a:solidFill>
+                <a:effectLst/>
+                <a:latin typeface="+mn-lt"/>
+                <a:ea typeface="+mn-ea"/>
+                <a:cs typeface="+mn-cs"/>
+              </a:rPr>
+              <a:t>)](</a:t>
+            </a:r>
+            <a:r>
+              <a:rPr lang="en-AU" sz="1200" b="0" u="sng" kern="1200" dirty="0">
+                <a:solidFill>
+                  <a:schemeClr val="tx1"/>
+                </a:solidFill>
+                <a:effectLst/>
+                <a:latin typeface="+mn-lt"/>
+                <a:ea typeface="+mn-ea"/>
+                <a:cs typeface="+mn-cs"/>
+              </a:rPr>
+              <a:t>https://0xpatrik.com/subdomain-takeover-basics/</a:t>
+            </a:r>
+            <a:r>
+              <a:rPr lang="en-AU" sz="1200" b="0" kern="1200" dirty="0">
+                <a:solidFill>
+                  <a:schemeClr val="tx1"/>
+                </a:solidFill>
+                <a:effectLst/>
+                <a:latin typeface="+mn-lt"/>
+                <a:ea typeface="+mn-ea"/>
+                <a:cs typeface="+mn-cs"/>
+              </a:rPr>
+              <a:t>)</a:t>
+            </a:r>
+          </a:p>
+          <a:p>
+            <a:br>
+              <a:rPr lang="en-AU" sz="1200" b="0" kern="1200" dirty="0">
+                <a:solidFill>
+                  <a:schemeClr val="tx1"/>
+                </a:solidFill>
+                <a:effectLst/>
+                <a:latin typeface="+mn-lt"/>
+                <a:ea typeface="+mn-ea"/>
+                <a:cs typeface="+mn-cs"/>
+              </a:rPr>
+            </a:br>
+            <a:r>
+              <a:rPr lang="en-AU" sz="1200" b="0" kern="1200" dirty="0">
+                <a:solidFill>
+                  <a:schemeClr val="tx1"/>
+                </a:solidFill>
+                <a:effectLst/>
+                <a:latin typeface="+mn-lt"/>
+                <a:ea typeface="+mn-ea"/>
+                <a:cs typeface="+mn-cs"/>
+              </a:rPr>
+              <a:t>[Subdomain takeover](</a:t>
+            </a:r>
+            <a:r>
+              <a:rPr lang="en-AU" sz="1200" b="0" u="sng" kern="1200" dirty="0">
+                <a:solidFill>
+                  <a:schemeClr val="tx1"/>
+                </a:solidFill>
+                <a:effectLst/>
+                <a:latin typeface="+mn-lt"/>
+                <a:ea typeface="+mn-ea"/>
+                <a:cs typeface="+mn-cs"/>
+              </a:rPr>
+              <a:t>https://</a:t>
+            </a:r>
+            <a:r>
+              <a:rPr lang="en-AU" sz="1200" b="0" u="sng" kern="1200" dirty="0" err="1">
+                <a:solidFill>
+                  <a:schemeClr val="tx1"/>
+                </a:solidFill>
+                <a:effectLst/>
+                <a:latin typeface="+mn-lt"/>
+                <a:ea typeface="+mn-ea"/>
+                <a:cs typeface="+mn-cs"/>
+              </a:rPr>
+              <a:t>www.hackerone.com</a:t>
+            </a:r>
+            <a:r>
+              <a:rPr lang="en-AU" sz="1200" b="0" u="sng" kern="1200" dirty="0">
+                <a:solidFill>
+                  <a:schemeClr val="tx1"/>
+                </a:solidFill>
+                <a:effectLst/>
+                <a:latin typeface="+mn-lt"/>
+                <a:ea typeface="+mn-ea"/>
+                <a:cs typeface="+mn-cs"/>
+              </a:rPr>
+              <a:t>/blog/Guide-Subdomain-Takeovers</a:t>
+            </a:r>
+            <a:r>
+              <a:rPr lang="en-AU" sz="1200" b="0" kern="1200" dirty="0">
+                <a:solidFill>
+                  <a:schemeClr val="tx1"/>
+                </a:solidFill>
+                <a:effectLst/>
+                <a:latin typeface="+mn-lt"/>
+                <a:ea typeface="+mn-ea"/>
+                <a:cs typeface="+mn-cs"/>
+              </a:rPr>
+              <a:t>)</a:t>
+            </a:r>
+          </a:p>
+          <a:p>
+            <a:br>
+              <a:rPr lang="en-AU" sz="1200" b="0" kern="1200" dirty="0">
+                <a:solidFill>
+                  <a:schemeClr val="tx1"/>
+                </a:solidFill>
+                <a:effectLst/>
+                <a:latin typeface="+mn-lt"/>
+                <a:ea typeface="+mn-ea"/>
+                <a:cs typeface="+mn-cs"/>
+              </a:rPr>
+            </a:br>
+            <a:r>
+              <a:rPr lang="en-AU" sz="1200" b="0" kern="1200" dirty="0">
+                <a:solidFill>
+                  <a:schemeClr val="tx1"/>
+                </a:solidFill>
+                <a:effectLst/>
+                <a:latin typeface="+mn-lt"/>
+                <a:ea typeface="+mn-ea"/>
+                <a:cs typeface="+mn-cs"/>
+              </a:rPr>
+              <a:t>[NS takeover](</a:t>
+            </a:r>
+            <a:r>
+              <a:rPr lang="en-AU" sz="1200" b="0" u="sng" kern="1200" dirty="0">
+                <a:solidFill>
+                  <a:schemeClr val="tx1"/>
+                </a:solidFill>
+                <a:effectLst/>
+                <a:latin typeface="+mn-lt"/>
+                <a:ea typeface="+mn-ea"/>
+                <a:cs typeface="+mn-cs"/>
+              </a:rPr>
+              <a:t>https://0xpatrik.com/subdomain-takeover-ns/</a:t>
+            </a:r>
+            <a:r>
+              <a:rPr lang="en-AU" sz="1200" b="0" kern="1200" dirty="0">
+                <a:solidFill>
+                  <a:schemeClr val="tx1"/>
+                </a:solidFill>
+                <a:effectLst/>
+                <a:latin typeface="+mn-lt"/>
+                <a:ea typeface="+mn-ea"/>
+                <a:cs typeface="+mn-cs"/>
+              </a:rPr>
+              <a:t>)</a:t>
+            </a:r>
+          </a:p>
+          <a:p>
+            <a:br>
+              <a:rPr lang="en-AU" sz="1200" b="0" kern="1200" dirty="0">
+                <a:solidFill>
+                  <a:schemeClr val="tx1"/>
+                </a:solidFill>
+                <a:effectLst/>
+                <a:latin typeface="+mn-lt"/>
+                <a:ea typeface="+mn-ea"/>
+                <a:cs typeface="+mn-cs"/>
+              </a:rPr>
+            </a:br>
+            <a:r>
+              <a:rPr lang="en-AU" sz="1200" b="0" kern="1200" dirty="0">
+                <a:solidFill>
+                  <a:schemeClr val="tx1"/>
+                </a:solidFill>
+                <a:effectLst/>
+                <a:latin typeface="+mn-lt"/>
+                <a:ea typeface="+mn-ea"/>
+                <a:cs typeface="+mn-cs"/>
+              </a:rPr>
+              <a:t>[Detailed write-up](</a:t>
+            </a:r>
+            <a:r>
+              <a:rPr lang="en-AU" sz="1200" b="0" u="sng" kern="1200" dirty="0">
+                <a:solidFill>
+                  <a:schemeClr val="tx1"/>
+                </a:solidFill>
+                <a:effectLst/>
+                <a:latin typeface="+mn-lt"/>
+                <a:ea typeface="+mn-ea"/>
+                <a:cs typeface="+mn-cs"/>
+              </a:rPr>
+              <a:t>https://</a:t>
+            </a:r>
+            <a:r>
+              <a:rPr lang="en-AU" sz="1200" b="0" u="sng" kern="1200" dirty="0" err="1">
+                <a:solidFill>
+                  <a:schemeClr val="tx1"/>
+                </a:solidFill>
+                <a:effectLst/>
+                <a:latin typeface="+mn-lt"/>
+                <a:ea typeface="+mn-ea"/>
+                <a:cs typeface="+mn-cs"/>
+              </a:rPr>
+              <a:t>thehackerblog.com</a:t>
+            </a:r>
+            <a:r>
+              <a:rPr lang="en-AU" sz="1200" b="0" u="sng" kern="1200" dirty="0">
+                <a:solidFill>
+                  <a:schemeClr val="tx1"/>
+                </a:solidFill>
+                <a:effectLst/>
+                <a:latin typeface="+mn-lt"/>
+                <a:ea typeface="+mn-ea"/>
+                <a:cs typeface="+mn-cs"/>
+              </a:rPr>
+              <a:t>/the-orphaned-internet-taking-over-120k-domains-via-a-dns-vulnerability-in-aws-google-cloud-rackspace-and-digital-ocean/</a:t>
+            </a:r>
+            <a:r>
+              <a:rPr lang="en-AU" sz="1200" b="0" kern="1200" dirty="0">
+                <a:solidFill>
+                  <a:schemeClr val="tx1"/>
+                </a:solidFill>
+                <a:effectLst/>
+                <a:latin typeface="+mn-lt"/>
+                <a:ea typeface="+mn-ea"/>
+                <a:cs typeface="+mn-cs"/>
+              </a:rPr>
+              <a:t>)</a:t>
+            </a:r>
+          </a:p>
+          <a:p>
             <a:endParaRPr lang="en-US" dirty="0"/>
           </a:p>
         </p:txBody>
@@ -1432,9 +1434,9 @@
           <a:bodyPr/>
           <a:lstStyle/>
           <a:p>
-            <a:fld id="{2B40201D-7602-074C-A878-E3718E537E14}" type="slidenum">
+            <a:fld id="{1EAEF871-98C5-8C4A-BC92-759A8CBA21D0}" type="slidenum">
               <a:rPr lang="en-US" smtClean="0"/>
-              <a:t>7</a:t>
+              <a:t>6</a:t>
             </a:fld>
             <a:endParaRPr lang="en-US"/>
           </a:p>
@@ -1443,7 +1445,7 @@
     </p:spTree>
     <p:extLst>
       <p:ext uri="{BB962C8B-B14F-4D97-AF65-F5344CB8AC3E}">
-        <p14:creationId xmlns:p14="http://schemas.microsoft.com/office/powerpoint/2010/main" val="3038268280"/>
+        <p14:creationId xmlns:p14="http://schemas.microsoft.com/office/powerpoint/2010/main" val="2710125609"/>
       </p:ext>
     </p:extLst>
   </p:cSld>
@@ -1497,6 +1499,96 @@
           <a:bodyPr/>
           <a:lstStyle/>
           <a:p>
+            <a:r>
+              <a:rPr lang="en-AU" dirty="0">
+                <a:hlinkClick r:id="rId3"/>
+              </a:rPr>
+              <a:t>https://docs.aws.amazon.com/Route53/latest/DeveloperGuide/domain-lock.html</a:t>
+            </a:r>
+            <a:endParaRPr lang="en-US" dirty="0"/>
+          </a:p>
+        </p:txBody>
+      </p:sp>
+      <p:sp>
+        <p:nvSpPr>
+          <p:cNvPr id="4" name="Slide Number Placeholder 3"/>
+          <p:cNvSpPr>
+            <a:spLocks noGrp="1"/>
+          </p:cNvSpPr>
+          <p:nvPr>
+            <p:ph type="sldNum" sz="quarter" idx="5"/>
+          </p:nvPr>
+        </p:nvSpPr>
+        <p:spPr/>
+        <p:txBody>
+          <a:bodyPr/>
+          <a:lstStyle/>
+          <a:p>
+            <a:fld id="{2B40201D-7602-074C-A878-E3718E537E14}" type="slidenum">
+              <a:rPr lang="en-US" smtClean="0"/>
+              <a:t>7</a:t>
+            </a:fld>
+            <a:endParaRPr lang="en-US"/>
+          </a:p>
+        </p:txBody>
+      </p:sp>
+    </p:spTree>
+    <p:extLst>
+      <p:ext uri="{BB962C8B-B14F-4D97-AF65-F5344CB8AC3E}">
+        <p14:creationId xmlns:p14="http://schemas.microsoft.com/office/powerpoint/2010/main" val="3038268280"/>
+      </p:ext>
+    </p:extLst>
+  </p:cSld>
+  <p:clrMapOvr>
+    <a:masterClrMapping/>
+  </p:clrMapOvr>
+</p:notes>
+</file>
+
+<file path=ppt/notesSlides/notesSlide7.xml><?xml version="1.0" encoding="utf-8"?>
+<p:notes xmlns:a="http://schemas.openxmlformats.org/drawingml/2006/main" xmlns:r="http://schemas.openxmlformats.org/officeDocument/2006/relationships" xmlns:p="http://schemas.openxmlformats.org/presentationml/2006/main">
+  <p:cSld>
+    <p:spTree>
+      <p:nvGrpSpPr>
+        <p:cNvPr id="1" name=""/>
+        <p:cNvGrpSpPr/>
+        <p:nvPr/>
+      </p:nvGrpSpPr>
+      <p:grpSpPr>
+        <a:xfrm>
+          <a:off x="0" y="0"/>
+          <a:ext cx="0" cy="0"/>
+          <a:chOff x="0" y="0"/>
+          <a:chExt cx="0" cy="0"/>
+        </a:xfrm>
+      </p:grpSpPr>
+      <p:sp>
+        <p:nvSpPr>
+          <p:cNvPr id="2" name="Slide Image Placeholder 1"/>
+          <p:cNvSpPr>
+            <a:spLocks noGrp="1" noRot="1" noChangeAspect="1"/>
+          </p:cNvSpPr>
+          <p:nvPr>
+            <p:ph type="sldImg"/>
+          </p:nvPr>
+        </p:nvSpPr>
+        <p:spPr/>
+      </p:sp>
+      <p:sp>
+        <p:nvSpPr>
+          <p:cNvPr id="3" name="Notes Placeholder 2"/>
+          <p:cNvSpPr>
+            <a:spLocks noGrp="1"/>
+          </p:cNvSpPr>
+          <p:nvPr>
+            <p:ph type="body" idx="1"/>
+          </p:nvPr>
+        </p:nvSpPr>
+        <p:spPr/>
+        <p:txBody>
+          <a:bodyPr/>
+          <a:lstStyle/>
+          <a:p>
             <a:endParaRPr lang="en-US" dirty="0"/>
           </a:p>
         </p:txBody>
@@ -1537,7 +1629,7 @@
 </p:notes>
 </file>
 
-<file path=ppt/notesSlides/notesSlide7.xml><?xml version="1.0" encoding="utf-8"?>
+<file path=ppt/notesSlides/notesSlide8.xml><?xml version="1.0" encoding="utf-8"?>
 <p:notes xmlns:a="http://schemas.openxmlformats.org/drawingml/2006/main" xmlns:r="http://schemas.openxmlformats.org/officeDocument/2006/relationships" xmlns:p="http://schemas.openxmlformats.org/presentationml/2006/main">
   <p:cSld>
     <p:spTree>
@@ -1725,7 +1817,7 @@
           <a:effectLst/>
           <a:extLst>
             <a:ext uri="{91240B29-F687-4f45-9708-019B960494DF}">
-              <a14:hiddenLine xmlns="" xmlns:a14="http://schemas.microsoft.com/office/drawing/2010/main" w="9525">
+              <a14:hiddenLine xmlns:a14="http://schemas.microsoft.com/office/drawing/2010/main" xmlns="" w="9525">
                 <a:solidFill>
                   <a:srgbClr val="000000"/>
                 </a:solidFill>
@@ -3235,7 +3327,7 @@
           <a:ln/>
           <a:extLst>
             <a:ext uri="{91240B29-F687-4f45-9708-019B960494DF}">
-              <a14:hiddenLine xmlns="" xmlns:a14="http://schemas.microsoft.com/office/drawing/2010/main" w="9525">
+              <a14:hiddenLine xmlns:a14="http://schemas.microsoft.com/office/drawing/2010/main" xmlns="" w="9525">
                 <a:solidFill>
                   <a:srgbClr val="000000"/>
                 </a:solidFill>
@@ -3507,7 +3599,7 @@
           <a:ln/>
           <a:extLst>
             <a:ext uri="{91240B29-F687-4f45-9708-019B960494DF}">
-              <a14:hiddenLine xmlns="" xmlns:a14="http://schemas.microsoft.com/office/drawing/2010/main" w="9525">
+              <a14:hiddenLine xmlns:a14="http://schemas.microsoft.com/office/drawing/2010/main" xmlns="" w="9525">
                 <a:solidFill>
                   <a:srgbClr val="000000"/>
                 </a:solidFill>
@@ -3787,7 +3879,7 @@
           <a:ln/>
           <a:extLst>
             <a:ext uri="{91240B29-F687-4f45-9708-019B960494DF}">
-              <a14:hiddenLine xmlns="" xmlns:a14="http://schemas.microsoft.com/office/drawing/2010/main" w="9525">
+              <a14:hiddenLine xmlns:a14="http://schemas.microsoft.com/office/drawing/2010/main" xmlns="" w="9525">
                 <a:solidFill>
                   <a:srgbClr val="000000"/>
                 </a:solidFill>
@@ -4407,7 +4499,7 @@
           <a:ln/>
           <a:extLst>
             <a:ext uri="{91240B29-F687-4f45-9708-019B960494DF}">
-              <a14:hiddenLine xmlns="" xmlns:a14="http://schemas.microsoft.com/office/drawing/2010/main" w="9525">
+              <a14:hiddenLine xmlns:a14="http://schemas.microsoft.com/office/drawing/2010/main" xmlns="" w="9525">
                 <a:solidFill>
                   <a:srgbClr val="000000"/>
                 </a:solidFill>
@@ -4743,7 +4835,7 @@
           <a:ln/>
           <a:extLst>
             <a:ext uri="{91240B29-F687-4f45-9708-019B960494DF}">
-              <a14:hiddenLine xmlns="" xmlns:a14="http://schemas.microsoft.com/office/drawing/2010/main" w="9525">
+              <a14:hiddenLine xmlns:a14="http://schemas.microsoft.com/office/drawing/2010/main" xmlns="" w="9525">
                 <a:solidFill>
                   <a:srgbClr val="000000"/>
                 </a:solidFill>
@@ -5217,7 +5309,7 @@
           <a:ln/>
           <a:extLst>
             <a:ext uri="{91240B29-F687-4f45-9708-019B960494DF}">
-              <a14:hiddenLine xmlns="" xmlns:a14="http://schemas.microsoft.com/office/drawing/2010/main" w="9525">
+              <a14:hiddenLine xmlns:a14="http://schemas.microsoft.com/office/drawing/2010/main" xmlns="" w="9525">
                 <a:solidFill>
                   <a:srgbClr val="000000"/>
                 </a:solidFill>
@@ -5640,7 +5732,7 @@
           <a:ln/>
           <a:extLst>
             <a:ext uri="{91240B29-F687-4f45-9708-019B960494DF}">
-              <a14:hiddenLine xmlns="" xmlns:a14="http://schemas.microsoft.com/office/drawing/2010/main" w="9525">
+              <a14:hiddenLine xmlns:a14="http://schemas.microsoft.com/office/drawing/2010/main" xmlns="" w="9525">
                 <a:solidFill>
                   <a:srgbClr val="000000"/>
                 </a:solidFill>
@@ -7681,12 +7773,12 @@
               <a:t>browers</a:t>
             </a:r>
             <a:r>
-              <a:rPr lang="en-US" dirty="0"/>
-              <a:t> </a:t>
+              <a:rPr lang="en-US"/>
+              <a:t> e.g</a:t>
             </a:r>
             <a:r>
               <a:rPr lang="en-US" dirty="0" err="1"/>
-              <a:t>eg.</a:t>
+              <a:t>.</a:t>
             </a:r>
             <a:r>
               <a:rPr lang="en-US" dirty="0"/>
@@ -9042,7 +9134,7 @@
         </p:spPr>
         <p:txBody>
           <a:bodyPr>
-            <a:normAutofit fontScale="85000" lnSpcReduction="20000"/>
+            <a:normAutofit fontScale="55000" lnSpcReduction="20000"/>
           </a:bodyPr>
           <a:lstStyle/>
           <a:p>
@@ -9120,6 +9212,52 @@
             <a:r>
               <a:rPr lang="en-AU" dirty="0"/>
               <a:t>😎</a:t>
+            </a:r>
+          </a:p>
+          <a:p>
+            <a:pPr marL="0" indent="0">
+              <a:buNone/>
+            </a:pPr>
+            <a:endParaRPr lang="en-AU" dirty="0"/>
+          </a:p>
+          <a:p>
+            <a:pPr marL="0" indent="0">
+              <a:buNone/>
+            </a:pPr>
+            <a:r>
+              <a:rPr lang="en-AU" dirty="0"/>
+              <a:t>If you remove </a:t>
+            </a:r>
+            <a:r>
+              <a:rPr lang="en-AU" dirty="0" err="1"/>
+              <a:t>cloudfront</a:t>
+            </a:r>
+            <a:r>
+              <a:rPr lang="en-AU" dirty="0"/>
+              <a:t>, your website will appear as being misconfigured (it won’t work)</a:t>
+            </a:r>
+          </a:p>
+          <a:p>
+            <a:pPr marL="0" indent="0">
+              <a:buNone/>
+            </a:pPr>
+            <a:endParaRPr lang="en-AU" dirty="0"/>
+          </a:p>
+          <a:p>
+            <a:pPr marL="0" indent="0">
+              <a:buNone/>
+            </a:pPr>
+            <a:r>
+              <a:rPr lang="en-AU" dirty="0"/>
+              <a:t>Someone could then point your website to their </a:t>
+            </a:r>
+            <a:r>
+              <a:rPr lang="en-AU" dirty="0" err="1"/>
+              <a:t>Cloudfront</a:t>
+            </a:r>
+            <a:r>
+              <a:rPr lang="en-AU" dirty="0"/>
+              <a:t> in their account.</a:t>
             </a:r>
           </a:p>
           <a:p>
@@ -9596,7 +9734,7 @@
             </a:pPr>
             <a:r>
               <a:rPr lang="en-US" dirty="0"/>
-              <a:t>Your create an Elastic IP (EIP) and associate it with an AWS resource</a:t>
+              <a:t>You create an Elastic IP (EIP) and associate it with an AWS resource</a:t>
             </a:r>
           </a:p>
           <a:p>

</xml_diff>